<commit_message>
figure 5 templates added
Signed-off-by: loopasam <samuel.croset@gmail.com>
</commit_message>
<xml_diff>
--- a/data/analysis/figures-paper/Figure_6.pptx
+++ b/data/analysis/figures-paper/Figure_6.pptx
@@ -3119,8 +3119,8 @@
         </p:nvSpPr>
         <p:spPr>
           <a:xfrm>
-            <a:off x="2085051" y="301040"/>
-            <a:ext cx="1085926" cy="1219357"/>
+            <a:off x="2074636" y="434723"/>
+            <a:ext cx="1085926" cy="790797"/>
           </a:xfrm>
           <a:prstGeom prst="roundRect">
             <a:avLst>
@@ -3159,7 +3159,7 @@
           <a:lstStyle/>
           <a:p>
             <a:pPr algn="ctr"/>
-            <a:endParaRPr lang="en-US" sz="900">
+            <a:endParaRPr lang="en-US" sz="800">
               <a:latin typeface="Times New Roman" panose="02020603050405020304" pitchFamily="18" charset="0"/>
               <a:cs typeface="Times New Roman" panose="02020603050405020304" pitchFamily="18" charset="0"/>
             </a:endParaRPr>
@@ -3174,8 +3174,8 @@
         </p:nvSpPr>
         <p:spPr>
           <a:xfrm>
-            <a:off x="256929" y="288794"/>
-            <a:ext cx="1728171" cy="3826007"/>
+            <a:off x="256929" y="423791"/>
+            <a:ext cx="1728171" cy="2591780"/>
           </a:xfrm>
           <a:prstGeom prst="roundRect">
             <a:avLst>
@@ -3214,7 +3214,7 @@
           <a:lstStyle/>
           <a:p>
             <a:pPr algn="ctr"/>
-            <a:endParaRPr lang="en-US" sz="900" dirty="0">
+            <a:endParaRPr lang="en-US" sz="800" dirty="0">
               <a:latin typeface="Times New Roman" panose="02020603050405020304" pitchFamily="18" charset="0"/>
               <a:cs typeface="Times New Roman" panose="02020603050405020304" pitchFamily="18" charset="0"/>
             </a:endParaRPr>
@@ -3229,8 +3229,8 @@
         </p:nvSpPr>
         <p:spPr>
           <a:xfrm>
-            <a:off x="433201" y="266904"/>
-            <a:ext cx="1448709" cy="369332"/>
+            <a:off x="441179" y="423792"/>
+            <a:ext cx="1649488" cy="215444"/>
           </a:xfrm>
           <a:prstGeom prst="rect">
             <a:avLst/>
@@ -3243,7 +3243,7 @@
           <a:lstStyle/>
           <a:p>
             <a:r>
-              <a:rPr lang="en-US" sz="900" b="1" dirty="0">
+              <a:rPr lang="en-US" sz="800" b="1" dirty="0">
                 <a:latin typeface="Times New Roman" panose="02020603050405020304" pitchFamily="18" charset="0"/>
                 <a:cs typeface="Times New Roman" panose="02020603050405020304" pitchFamily="18" charset="0"/>
               </a:rPr>
@@ -3254,151 +3254,14 @@
       </p:sp>
       <p:sp>
         <p:nvSpPr>
-          <p:cNvPr id="17" name="Rounded Rectangle 16"/>
-          <p:cNvSpPr/>
-          <p:nvPr/>
-        </p:nvSpPr>
-        <p:spPr>
-          <a:xfrm>
-            <a:off x="315992" y="1176406"/>
-            <a:ext cx="1235814" cy="347594"/>
-          </a:xfrm>
-          <a:prstGeom prst="roundRect">
-            <a:avLst/>
-          </a:prstGeom>
-          <a:solidFill>
-            <a:schemeClr val="bg1">
-              <a:lumMod val="95000"/>
-            </a:schemeClr>
-          </a:solidFill>
-          <a:ln w="6350">
-            <a:solidFill>
-              <a:schemeClr val="tx1"/>
-            </a:solidFill>
-          </a:ln>
-        </p:spPr>
-        <p:style>
-          <a:lnRef idx="2">
-            <a:schemeClr val="accent1">
-              <a:shade val="50000"/>
-            </a:schemeClr>
-          </a:lnRef>
-          <a:fillRef idx="1">
-            <a:schemeClr val="accent1"/>
-          </a:fillRef>
-          <a:effectRef idx="0">
-            <a:schemeClr val="accent1"/>
-          </a:effectRef>
-          <a:fontRef idx="minor">
-            <a:schemeClr val="lt1"/>
-          </a:fontRef>
-        </p:style>
-        <p:txBody>
-          <a:bodyPr rtlCol="0" anchor="ctr"/>
-          <a:lstStyle/>
-          <a:p>
-            <a:pPr algn="ctr"/>
-            <a:endParaRPr lang="en-US" sz="900">
-              <a:latin typeface="Times New Roman" panose="02020603050405020304" pitchFamily="18" charset="0"/>
-              <a:cs typeface="Times New Roman" panose="02020603050405020304" pitchFamily="18" charset="0"/>
-            </a:endParaRPr>
-          </a:p>
-        </p:txBody>
-      </p:sp>
-      <p:sp>
-        <p:nvSpPr>
-          <p:cNvPr id="15" name="Rectangle 14"/>
-          <p:cNvSpPr/>
-          <p:nvPr/>
-        </p:nvSpPr>
-        <p:spPr>
-          <a:xfrm>
-            <a:off x="483496" y="1138313"/>
-            <a:ext cx="806631" cy="230832"/>
-          </a:xfrm>
-          <a:prstGeom prst="rect">
-            <a:avLst/>
-          </a:prstGeom>
-        </p:spPr>
-        <p:txBody>
-          <a:bodyPr wrap="none">
-            <a:spAutoFit/>
-          </a:bodyPr>
-          <a:lstStyle/>
-          <a:p>
-            <a:r>
-              <a:rPr lang="en-US" sz="900" dirty="0" err="1">
-                <a:latin typeface="Times New Roman" panose="02020603050405020304" pitchFamily="18" charset="0"/>
-                <a:cs typeface="Times New Roman" panose="02020603050405020304" pitchFamily="18" charset="0"/>
-              </a:rPr>
-              <a:t>Tubocurarine</a:t>
-            </a:r>
-            <a:endParaRPr lang="en-US" sz="900" dirty="0">
-              <a:latin typeface="Times New Roman" panose="02020603050405020304" pitchFamily="18" charset="0"/>
-              <a:cs typeface="Times New Roman" panose="02020603050405020304" pitchFamily="18" charset="0"/>
-            </a:endParaRPr>
-          </a:p>
-        </p:txBody>
-      </p:sp>
-      <p:sp>
-        <p:nvSpPr>
-          <p:cNvPr id="16" name="Rectangle 15"/>
-          <p:cNvSpPr/>
-          <p:nvPr/>
-        </p:nvSpPr>
-        <p:spPr>
-          <a:xfrm>
-            <a:off x="315992" y="1289565"/>
-            <a:ext cx="1265090" cy="230832"/>
-          </a:xfrm>
-          <a:prstGeom prst="rect">
-            <a:avLst/>
-          </a:prstGeom>
-        </p:spPr>
-        <p:txBody>
-          <a:bodyPr wrap="none">
-            <a:spAutoFit/>
-          </a:bodyPr>
-          <a:lstStyle/>
-          <a:p>
-            <a:r>
-              <a:rPr lang="en-US" sz="900" dirty="0" err="1">
-                <a:latin typeface="Times New Roman" panose="02020603050405020304" pitchFamily="18" charset="0"/>
-                <a:cs typeface="Times New Roman" panose="02020603050405020304" pitchFamily="18" charset="0"/>
-              </a:rPr>
-              <a:t>Gallamine</a:t>
-            </a:r>
-            <a:r>
-              <a:rPr lang="en-US" sz="900" dirty="0">
-                <a:latin typeface="Times New Roman" panose="02020603050405020304" pitchFamily="18" charset="0"/>
-                <a:cs typeface="Times New Roman" panose="02020603050405020304" pitchFamily="18" charset="0"/>
-              </a:rPr>
-              <a:t> </a:t>
-            </a:r>
-            <a:r>
-              <a:rPr lang="en-US" sz="900" dirty="0" err="1">
-                <a:latin typeface="Times New Roman" panose="02020603050405020304" pitchFamily="18" charset="0"/>
-                <a:cs typeface="Times New Roman" panose="02020603050405020304" pitchFamily="18" charset="0"/>
-              </a:rPr>
-              <a:t>Triethiodide</a:t>
-            </a:r>
-            <a:endParaRPr lang="en-US" sz="900" dirty="0">
-              <a:latin typeface="Times New Roman" panose="02020603050405020304" pitchFamily="18" charset="0"/>
-              <a:cs typeface="Times New Roman" panose="02020603050405020304" pitchFamily="18" charset="0"/>
-            </a:endParaRPr>
-          </a:p>
-        </p:txBody>
-      </p:sp>
-      <p:sp>
-        <p:nvSpPr>
           <p:cNvPr id="46" name="Rounded Rectangle 45"/>
           <p:cNvSpPr/>
           <p:nvPr/>
         </p:nvSpPr>
         <p:spPr>
           <a:xfrm>
-            <a:off x="2080910" y="3161389"/>
-            <a:ext cx="1090066" cy="946319"/>
+            <a:off x="2085051" y="2224952"/>
+            <a:ext cx="1090066" cy="790619"/>
           </a:xfrm>
           <a:prstGeom prst="roundRect">
             <a:avLst>
@@ -3437,7 +3300,7 @@
           <a:lstStyle/>
           <a:p>
             <a:pPr algn="ctr"/>
-            <a:endParaRPr lang="en-US" sz="900">
+            <a:endParaRPr lang="en-US" sz="800">
               <a:latin typeface="Times New Roman" panose="02020603050405020304" pitchFamily="18" charset="0"/>
               <a:cs typeface="Times New Roman" panose="02020603050405020304" pitchFamily="18" charset="0"/>
             </a:endParaRPr>
@@ -3452,8 +3315,8 @@
         </p:nvSpPr>
         <p:spPr>
           <a:xfrm>
-            <a:off x="2119174" y="3124200"/>
-            <a:ext cx="1081226" cy="646331"/>
+            <a:off x="2044918" y="2187763"/>
+            <a:ext cx="1185769" cy="584775"/>
           </a:xfrm>
           <a:prstGeom prst="rect">
             <a:avLst/>
@@ -3467,7 +3330,7 @@
           <a:p>
             <a:pPr algn="ctr"/>
             <a:r>
-              <a:rPr lang="en-US" sz="900" b="1" dirty="0">
+              <a:rPr lang="en-US" sz="800" b="1" dirty="0">
                 <a:latin typeface="Times New Roman" panose="02020603050405020304" pitchFamily="18" charset="0"/>
                 <a:cs typeface="Times New Roman" panose="02020603050405020304" pitchFamily="18" charset="0"/>
               </a:rPr>
@@ -3484,8 +3347,8 @@
         </p:nvSpPr>
         <p:spPr>
           <a:xfrm>
-            <a:off x="2317885" y="3897802"/>
-            <a:ext cx="652743" cy="230832"/>
+            <a:off x="2315295" y="2805031"/>
+            <a:ext cx="599844" cy="215444"/>
           </a:xfrm>
           <a:prstGeom prst="rect">
             <a:avLst/>
@@ -3498,13 +3361,13 @@
           <a:lstStyle/>
           <a:p>
             <a:r>
-              <a:rPr lang="en-US" sz="900" dirty="0" err="1">
+              <a:rPr lang="en-US" sz="800" dirty="0" err="1">
                 <a:latin typeface="Times New Roman" panose="02020603050405020304" pitchFamily="18" charset="0"/>
                 <a:cs typeface="Times New Roman" panose="02020603050405020304" pitchFamily="18" charset="0"/>
               </a:rPr>
               <a:t>Ezetimibe</a:t>
             </a:r>
-            <a:endParaRPr lang="en-US" sz="900" dirty="0">
+            <a:endParaRPr lang="en-US" sz="800" dirty="0">
               <a:latin typeface="Times New Roman" panose="02020603050405020304" pitchFamily="18" charset="0"/>
               <a:cs typeface="Times New Roman" panose="02020603050405020304" pitchFamily="18" charset="0"/>
             </a:endParaRPr>
@@ -3519,8 +3382,8 @@
         </p:nvSpPr>
         <p:spPr>
           <a:xfrm>
-            <a:off x="2295858" y="3733800"/>
-            <a:ext cx="684803" cy="230832"/>
+            <a:off x="2316536" y="2675396"/>
+            <a:ext cx="627095" cy="215444"/>
           </a:xfrm>
           <a:prstGeom prst="rect">
             <a:avLst/>
@@ -3533,13 +3396,13 @@
           <a:lstStyle/>
           <a:p>
             <a:r>
-              <a:rPr lang="en-US" sz="900" dirty="0" err="1">
+              <a:rPr lang="en-US" sz="800" dirty="0" err="1">
                 <a:latin typeface="Times New Roman" panose="02020603050405020304" pitchFamily="18" charset="0"/>
                 <a:cs typeface="Times New Roman" panose="02020603050405020304" pitchFamily="18" charset="0"/>
               </a:rPr>
               <a:t>Hesperetin</a:t>
             </a:r>
-            <a:endParaRPr lang="en-US" sz="900" dirty="0">
+            <a:endParaRPr lang="en-US" sz="800" dirty="0">
               <a:latin typeface="Times New Roman" panose="02020603050405020304" pitchFamily="18" charset="0"/>
               <a:cs typeface="Times New Roman" panose="02020603050405020304" pitchFamily="18" charset="0"/>
             </a:endParaRPr>
@@ -3554,8 +3417,8 @@
         </p:nvSpPr>
         <p:spPr>
           <a:xfrm>
-            <a:off x="2193903" y="286917"/>
-            <a:ext cx="1006497" cy="507831"/>
+            <a:off x="2183488" y="420600"/>
+            <a:ext cx="1006497" cy="338554"/>
           </a:xfrm>
           <a:prstGeom prst="rect">
             <a:avLst/>
@@ -3569,7 +3432,7 @@
           <a:p>
             <a:pPr algn="ctr"/>
             <a:r>
-              <a:rPr lang="en-US" sz="900" b="1" dirty="0">
+              <a:rPr lang="en-US" sz="800" b="1" dirty="0">
                 <a:latin typeface="Times New Roman" panose="02020603050405020304" pitchFamily="18" charset="0"/>
                 <a:cs typeface="Times New Roman" panose="02020603050405020304" pitchFamily="18" charset="0"/>
               </a:rPr>
@@ -3586,8 +3449,8 @@
         </p:nvSpPr>
         <p:spPr>
           <a:xfrm>
-            <a:off x="2259803" y="890564"/>
-            <a:ext cx="665567" cy="230832"/>
+            <a:off x="2593405" y="672813"/>
+            <a:ext cx="611065" cy="215444"/>
           </a:xfrm>
           <a:prstGeom prst="rect">
             <a:avLst/>
@@ -3600,13 +3463,13 @@
           <a:lstStyle/>
           <a:p>
             <a:r>
-              <a:rPr lang="en-US" sz="900" dirty="0" err="1">
+              <a:rPr lang="en-US" sz="800" dirty="0" err="1">
                 <a:latin typeface="Times New Roman" panose="02020603050405020304" pitchFamily="18" charset="0"/>
                 <a:cs typeface="Times New Roman" panose="02020603050405020304" pitchFamily="18" charset="0"/>
               </a:rPr>
               <a:t>Dipivefrin</a:t>
             </a:r>
-            <a:endParaRPr lang="en-US" sz="900" dirty="0">
+            <a:endParaRPr lang="en-US" sz="800" dirty="0">
               <a:latin typeface="Times New Roman" panose="02020603050405020304" pitchFamily="18" charset="0"/>
               <a:cs typeface="Times New Roman" panose="02020603050405020304" pitchFamily="18" charset="0"/>
             </a:endParaRPr>
@@ -3621,8 +3484,8 @@
         </p:nvSpPr>
         <p:spPr>
           <a:xfrm>
-            <a:off x="2236614" y="744304"/>
-            <a:ext cx="748923" cy="230832"/>
+            <a:off x="2038535" y="676256"/>
+            <a:ext cx="686406" cy="215444"/>
           </a:xfrm>
           <a:prstGeom prst="rect">
             <a:avLst/>
@@ -3635,13 +3498,13 @@
           <a:lstStyle/>
           <a:p>
             <a:r>
-              <a:rPr lang="en-US" sz="900" dirty="0" err="1">
+              <a:rPr lang="en-US" sz="800" dirty="0" err="1">
                 <a:latin typeface="Times New Roman" panose="02020603050405020304" pitchFamily="18" charset="0"/>
                 <a:cs typeface="Times New Roman" panose="02020603050405020304" pitchFamily="18" charset="0"/>
               </a:rPr>
               <a:t>Pralidoxime</a:t>
             </a:r>
-            <a:endParaRPr lang="en-US" sz="900" dirty="0">
+            <a:endParaRPr lang="en-US" sz="800" dirty="0">
               <a:latin typeface="Times New Roman" panose="02020603050405020304" pitchFamily="18" charset="0"/>
               <a:cs typeface="Times New Roman" panose="02020603050405020304" pitchFamily="18" charset="0"/>
             </a:endParaRPr>
@@ -3656,8 +3519,8 @@
         </p:nvSpPr>
         <p:spPr>
           <a:xfrm>
-            <a:off x="2085051" y="1571463"/>
-            <a:ext cx="1085925" cy="703854"/>
+            <a:off x="2085051" y="1260821"/>
+            <a:ext cx="1085925" cy="428874"/>
           </a:xfrm>
           <a:prstGeom prst="roundRect">
             <a:avLst>
@@ -3696,7 +3559,7 @@
           <a:lstStyle/>
           <a:p>
             <a:pPr algn="ctr"/>
-            <a:endParaRPr lang="en-US" sz="900">
+            <a:endParaRPr lang="en-US" sz="800">
               <a:latin typeface="Times New Roman" panose="02020603050405020304" pitchFamily="18" charset="0"/>
               <a:cs typeface="Times New Roman" panose="02020603050405020304" pitchFamily="18" charset="0"/>
             </a:endParaRPr>
@@ -3711,8 +3574,8 @@
         </p:nvSpPr>
         <p:spPr>
           <a:xfrm>
-            <a:off x="2136027" y="1611868"/>
-            <a:ext cx="1182357" cy="369332"/>
+            <a:off x="2136027" y="1225490"/>
+            <a:ext cx="1182357" cy="338554"/>
           </a:xfrm>
           <a:prstGeom prst="rect">
             <a:avLst/>
@@ -3726,7 +3589,7 @@
           <a:p>
             <a:pPr algn="ctr"/>
             <a:r>
-              <a:rPr lang="en-US" sz="900" b="1" dirty="0">
+              <a:rPr lang="en-US" sz="800" b="1" dirty="0">
                 <a:latin typeface="Times New Roman" panose="02020603050405020304" pitchFamily="18" charset="0"/>
                 <a:cs typeface="Times New Roman" panose="02020603050405020304" pitchFamily="18" charset="0"/>
               </a:rPr>
@@ -3743,8 +3606,8 @@
         </p:nvSpPr>
         <p:spPr>
           <a:xfrm>
-            <a:off x="2308269" y="1971803"/>
-            <a:ext cx="671979" cy="230832"/>
+            <a:off x="2340106" y="1483950"/>
+            <a:ext cx="617477" cy="215444"/>
           </a:xfrm>
           <a:prstGeom prst="rect">
             <a:avLst/>
@@ -3757,13 +3620,13 @@
           <a:lstStyle/>
           <a:p>
             <a:r>
-              <a:rPr lang="en-US" sz="900" dirty="0" err="1">
+              <a:rPr lang="en-US" sz="800" dirty="0" err="1">
                 <a:latin typeface="Times New Roman" panose="02020603050405020304" pitchFamily="18" charset="0"/>
                 <a:cs typeface="Times New Roman" panose="02020603050405020304" pitchFamily="18" charset="0"/>
               </a:rPr>
               <a:t>Vorinostat</a:t>
             </a:r>
-            <a:endParaRPr lang="en-US" sz="900" dirty="0">
+            <a:endParaRPr lang="en-US" sz="800" dirty="0">
               <a:latin typeface="Times New Roman" panose="02020603050405020304" pitchFamily="18" charset="0"/>
               <a:cs typeface="Times New Roman" panose="02020603050405020304" pitchFamily="18" charset="0"/>
             </a:endParaRPr>
@@ -3778,8 +3641,8 @@
         </p:nvSpPr>
         <p:spPr>
           <a:xfrm>
-            <a:off x="2085051" y="2333337"/>
-            <a:ext cx="1085925" cy="767461"/>
+            <a:off x="2081149" y="1738527"/>
+            <a:ext cx="1085925" cy="448698"/>
           </a:xfrm>
           <a:prstGeom prst="roundRect">
             <a:avLst>
@@ -3818,7 +3681,7 @@
           <a:lstStyle/>
           <a:p>
             <a:pPr algn="ctr"/>
-            <a:endParaRPr lang="en-US" sz="900">
+            <a:endParaRPr lang="en-US" sz="800">
               <a:latin typeface="Times New Roman" panose="02020603050405020304" pitchFamily="18" charset="0"/>
               <a:cs typeface="Times New Roman" panose="02020603050405020304" pitchFamily="18" charset="0"/>
             </a:endParaRPr>
@@ -3833,8 +3696,8 @@
         </p:nvSpPr>
         <p:spPr>
           <a:xfrm>
-            <a:off x="2236614" y="2317379"/>
-            <a:ext cx="993911" cy="507831"/>
+            <a:off x="2061570" y="1722568"/>
+            <a:ext cx="1165053" cy="338554"/>
           </a:xfrm>
           <a:prstGeom prst="rect">
             <a:avLst/>
@@ -3848,7 +3711,7 @@
           <a:p>
             <a:pPr algn="ctr"/>
             <a:r>
-              <a:rPr lang="en-US" sz="900" b="1" dirty="0">
+              <a:rPr lang="en-US" sz="800" b="1" dirty="0">
                 <a:latin typeface="Times New Roman" panose="02020603050405020304" pitchFamily="18" charset="0"/>
                 <a:cs typeface="Times New Roman" panose="02020603050405020304" pitchFamily="18" charset="0"/>
               </a:rPr>
@@ -3865,8 +3728,8 @@
         </p:nvSpPr>
         <p:spPr>
           <a:xfrm>
-            <a:off x="2338438" y="2844633"/>
-            <a:ext cx="556563" cy="230832"/>
+            <a:off x="2333131" y="2000908"/>
+            <a:ext cx="516488" cy="215444"/>
           </a:xfrm>
           <a:prstGeom prst="rect">
             <a:avLst/>
@@ -3879,7 +3742,7 @@
           <a:lstStyle/>
           <a:p>
             <a:r>
-              <a:rPr lang="en-US" sz="900" dirty="0">
+              <a:rPr lang="en-US" sz="800" dirty="0">
                 <a:latin typeface="Times New Roman" panose="02020603050405020304" pitchFamily="18" charset="0"/>
                 <a:cs typeface="Times New Roman" panose="02020603050405020304" pitchFamily="18" charset="0"/>
               </a:rPr>
@@ -3896,8 +3759,8 @@
         </p:nvSpPr>
         <p:spPr>
           <a:xfrm>
-            <a:off x="237890" y="265056"/>
-            <a:ext cx="344966" cy="230832"/>
+            <a:off x="232510" y="399277"/>
+            <a:ext cx="325730" cy="215444"/>
           </a:xfrm>
           <a:prstGeom prst="rect">
             <a:avLst/>
@@ -3910,13 +3773,13 @@
           <a:lstStyle/>
           <a:p>
             <a:r>
-              <a:rPr lang="en-US" sz="900" b="1" dirty="0" smtClean="0">
+              <a:rPr lang="en-US" sz="800" b="1" dirty="0" smtClean="0">
                 <a:latin typeface="Times New Roman" panose="02020603050405020304" pitchFamily="18" charset="0"/>
                 <a:cs typeface="Times New Roman" panose="02020603050405020304" pitchFamily="18" charset="0"/>
               </a:rPr>
               <a:t>(A)</a:t>
             </a:r>
-            <a:endParaRPr lang="en-US" sz="900" b="1" dirty="0">
+            <a:endParaRPr lang="en-US" sz="800" b="1" dirty="0">
               <a:latin typeface="Times New Roman" panose="02020603050405020304" pitchFamily="18" charset="0"/>
               <a:cs typeface="Times New Roman" panose="02020603050405020304" pitchFamily="18" charset="0"/>
             </a:endParaRPr>
@@ -3925,14 +3788,67 @@
       </p:sp>
       <p:sp>
         <p:nvSpPr>
-          <p:cNvPr id="60" name="Rectangle 59"/>
+          <p:cNvPr id="17" name="Rounded Rectangle 16"/>
           <p:cNvSpPr/>
           <p:nvPr/>
         </p:nvSpPr>
         <p:spPr>
           <a:xfrm>
-            <a:off x="269697" y="1128606"/>
-            <a:ext cx="319318" cy="230832"/>
+            <a:off x="1267590" y="621721"/>
+            <a:ext cx="678356" cy="445079"/>
+          </a:xfrm>
+          <a:prstGeom prst="roundRect">
+            <a:avLst/>
+          </a:prstGeom>
+          <a:solidFill>
+            <a:schemeClr val="bg1">
+              <a:lumMod val="95000"/>
+            </a:schemeClr>
+          </a:solidFill>
+          <a:ln w="6350">
+            <a:solidFill>
+              <a:schemeClr val="tx1"/>
+            </a:solidFill>
+          </a:ln>
+        </p:spPr>
+        <p:style>
+          <a:lnRef idx="2">
+            <a:schemeClr val="accent1">
+              <a:shade val="50000"/>
+            </a:schemeClr>
+          </a:lnRef>
+          <a:fillRef idx="1">
+            <a:schemeClr val="accent1"/>
+          </a:fillRef>
+          <a:effectRef idx="0">
+            <a:schemeClr val="accent1"/>
+          </a:effectRef>
+          <a:fontRef idx="minor">
+            <a:schemeClr val="lt1"/>
+          </a:fontRef>
+        </p:style>
+        <p:txBody>
+          <a:bodyPr rtlCol="0" anchor="ctr"/>
+          <a:lstStyle/>
+          <a:p>
+            <a:pPr algn="ctr"/>
+            <a:endParaRPr lang="en-US" sz="800">
+              <a:latin typeface="Times New Roman" panose="02020603050405020304" pitchFamily="18" charset="0"/>
+              <a:cs typeface="Times New Roman" panose="02020603050405020304" pitchFamily="18" charset="0"/>
+            </a:endParaRPr>
+          </a:p>
+        </p:txBody>
+      </p:sp>
+      <p:sp>
+        <p:nvSpPr>
+          <p:cNvPr id="15" name="Rectangle 14"/>
+          <p:cNvSpPr/>
+          <p:nvPr/>
+        </p:nvSpPr>
+        <p:spPr>
+          <a:xfrm>
+            <a:off x="1260546" y="852026"/>
+            <a:ext cx="734496" cy="215444"/>
           </a:xfrm>
           <a:prstGeom prst="rect">
             <a:avLst/>
@@ -3945,13 +3861,83 @@
           <a:lstStyle/>
           <a:p>
             <a:r>
-              <a:rPr lang="en-US" sz="900" b="1" dirty="0" smtClean="0">
+              <a:rPr lang="en-US" sz="800" dirty="0" err="1">
+                <a:latin typeface="Times New Roman" panose="02020603050405020304" pitchFamily="18" charset="0"/>
+                <a:cs typeface="Times New Roman" panose="02020603050405020304" pitchFamily="18" charset="0"/>
+              </a:rPr>
+              <a:t>Tubocurarine</a:t>
+            </a:r>
+            <a:endParaRPr lang="en-US" sz="800" dirty="0">
+              <a:latin typeface="Times New Roman" panose="02020603050405020304" pitchFamily="18" charset="0"/>
+              <a:cs typeface="Times New Roman" panose="02020603050405020304" pitchFamily="18" charset="0"/>
+            </a:endParaRPr>
+          </a:p>
+        </p:txBody>
+      </p:sp>
+      <p:sp>
+        <p:nvSpPr>
+          <p:cNvPr id="16" name="Rectangle 15"/>
+          <p:cNvSpPr/>
+          <p:nvPr/>
+        </p:nvSpPr>
+        <p:spPr>
+          <a:xfrm>
+            <a:off x="1367868" y="583781"/>
+            <a:ext cx="646763" cy="215444"/>
+          </a:xfrm>
+          <a:prstGeom prst="rect">
+            <a:avLst/>
+          </a:prstGeom>
+        </p:spPr>
+        <p:txBody>
+          <a:bodyPr wrap="square">
+            <a:spAutoFit/>
+          </a:bodyPr>
+          <a:lstStyle/>
+          <a:p>
+            <a:r>
+              <a:rPr lang="en-US" sz="800" dirty="0" err="1" smtClean="0">
+                <a:latin typeface="Times New Roman" panose="02020603050405020304" pitchFamily="18" charset="0"/>
+                <a:cs typeface="Times New Roman" panose="02020603050405020304" pitchFamily="18" charset="0"/>
+              </a:rPr>
+              <a:t>Gallamine</a:t>
+            </a:r>
+            <a:endParaRPr lang="en-US" sz="800" dirty="0">
+              <a:latin typeface="Times New Roman" panose="02020603050405020304" pitchFamily="18" charset="0"/>
+              <a:cs typeface="Times New Roman" panose="02020603050405020304" pitchFamily="18" charset="0"/>
+            </a:endParaRPr>
+          </a:p>
+        </p:txBody>
+      </p:sp>
+      <p:sp>
+        <p:nvSpPr>
+          <p:cNvPr id="60" name="Rectangle 59"/>
+          <p:cNvSpPr/>
+          <p:nvPr/>
+        </p:nvSpPr>
+        <p:spPr>
+          <a:xfrm>
+            <a:off x="1221295" y="573921"/>
+            <a:ext cx="303288" cy="215444"/>
+          </a:xfrm>
+          <a:prstGeom prst="rect">
+            <a:avLst/>
+          </a:prstGeom>
+        </p:spPr>
+        <p:txBody>
+          <a:bodyPr wrap="none">
+            <a:spAutoFit/>
+          </a:bodyPr>
+          <a:lstStyle/>
+          <a:p>
+            <a:r>
+              <a:rPr lang="en-US" sz="800" b="1" dirty="0" smtClean="0">
                 <a:latin typeface="Times New Roman" panose="02020603050405020304" pitchFamily="18" charset="0"/>
                 <a:cs typeface="Times New Roman" panose="02020603050405020304" pitchFamily="18" charset="0"/>
               </a:rPr>
               <a:t>(2)</a:t>
             </a:r>
-            <a:endParaRPr lang="en-US" sz="900" b="1" dirty="0">
+            <a:endParaRPr lang="en-US" sz="800" b="1" dirty="0">
               <a:latin typeface="Times New Roman" panose="02020603050405020304" pitchFamily="18" charset="0"/>
               <a:cs typeface="Times New Roman" panose="02020603050405020304" pitchFamily="18" charset="0"/>
             </a:endParaRPr>
@@ -3966,10 +3952,10 @@
         </p:nvGrpSpPr>
         <p:grpSpPr>
           <a:xfrm>
-            <a:off x="278124" y="1554412"/>
-            <a:ext cx="1523503" cy="1036388"/>
-            <a:chOff x="265095" y="1675013"/>
-            <a:chExt cx="1523503" cy="1036388"/>
+            <a:off x="437152" y="1116730"/>
+            <a:ext cx="1385552" cy="926641"/>
+            <a:chOff x="268439" y="1675013"/>
+            <a:chExt cx="1385552" cy="926641"/>
           </a:xfrm>
         </p:grpSpPr>
         <p:sp>
@@ -3981,7 +3967,7 @@
           <p:spPr>
             <a:xfrm>
               <a:off x="291924" y="1692064"/>
-              <a:ext cx="1446457" cy="1019337"/>
+              <a:ext cx="1305491" cy="895367"/>
             </a:xfrm>
             <a:prstGeom prst="roundRect">
               <a:avLst>
@@ -4020,7 +4006,7 @@
             <a:lstStyle/>
             <a:p>
               <a:pPr algn="ctr"/>
-              <a:endParaRPr lang="en-US" sz="900">
+              <a:endParaRPr lang="en-US" sz="800">
                 <a:latin typeface="Times New Roman" panose="02020603050405020304" pitchFamily="18" charset="0"/>
                 <a:cs typeface="Times New Roman" panose="02020603050405020304" pitchFamily="18" charset="0"/>
               </a:endParaRPr>
@@ -4035,8 +4021,8 @@
           </p:nvSpPr>
           <p:spPr>
             <a:xfrm>
-              <a:off x="982568" y="1992859"/>
-              <a:ext cx="537327" cy="230832"/>
+              <a:off x="1048029" y="1681498"/>
+              <a:ext cx="495649" cy="215444"/>
             </a:xfrm>
             <a:prstGeom prst="rect">
               <a:avLst/>
@@ -4049,13 +4035,13 @@
             <a:lstStyle/>
             <a:p>
               <a:r>
-                <a:rPr lang="en-US" sz="900" dirty="0" err="1">
+                <a:rPr lang="en-US" sz="800" dirty="0" err="1">
                   <a:latin typeface="Times New Roman" panose="02020603050405020304" pitchFamily="18" charset="0"/>
                   <a:cs typeface="Times New Roman" panose="02020603050405020304" pitchFamily="18" charset="0"/>
                 </a:rPr>
                 <a:t>Tacrine</a:t>
               </a:r>
-              <a:endParaRPr lang="en-US" sz="900" dirty="0">
+              <a:endParaRPr lang="en-US" sz="800" dirty="0">
                 <a:latin typeface="Times New Roman" panose="02020603050405020304" pitchFamily="18" charset="0"/>
                 <a:cs typeface="Times New Roman" panose="02020603050405020304" pitchFamily="18" charset="0"/>
               </a:endParaRPr>
@@ -4070,8 +4056,8 @@
           </p:nvSpPr>
           <p:spPr>
             <a:xfrm>
-              <a:off x="273868" y="2320963"/>
-              <a:ext cx="659155" cy="230832"/>
+              <a:off x="268439" y="2251613"/>
+              <a:ext cx="604653" cy="215444"/>
             </a:xfrm>
             <a:prstGeom prst="rect">
               <a:avLst/>
@@ -4084,7 +4070,7 @@
             <a:lstStyle/>
             <a:p>
               <a:r>
-                <a:rPr lang="en-US" sz="900" dirty="0">
+                <a:rPr lang="en-US" sz="800" dirty="0">
                   <a:latin typeface="Times New Roman" panose="02020603050405020304" pitchFamily="18" charset="0"/>
                   <a:cs typeface="Times New Roman" panose="02020603050405020304" pitchFamily="18" charset="0"/>
                 </a:rPr>
@@ -4101,8 +4087,8 @@
           </p:nvSpPr>
           <p:spPr>
             <a:xfrm>
-              <a:off x="265617" y="2165086"/>
-              <a:ext cx="889987" cy="230832"/>
+              <a:off x="269697" y="2128212"/>
+              <a:ext cx="813043" cy="215444"/>
             </a:xfrm>
             <a:prstGeom prst="rect">
               <a:avLst/>
@@ -4115,13 +4101,13 @@
             <a:lstStyle/>
             <a:p>
               <a:r>
-                <a:rPr lang="en-US" sz="900" dirty="0" err="1">
+                <a:rPr lang="en-US" sz="800" dirty="0" err="1">
                   <a:latin typeface="Times New Roman" panose="02020603050405020304" pitchFamily="18" charset="0"/>
                   <a:cs typeface="Times New Roman" panose="02020603050405020304" pitchFamily="18" charset="0"/>
                 </a:rPr>
                 <a:t>Pyridostigmine</a:t>
               </a:r>
-              <a:endParaRPr lang="en-US" sz="900" dirty="0">
+              <a:endParaRPr lang="en-US" sz="800" dirty="0">
                 <a:latin typeface="Times New Roman" panose="02020603050405020304" pitchFamily="18" charset="0"/>
                 <a:cs typeface="Times New Roman" panose="02020603050405020304" pitchFamily="18" charset="0"/>
               </a:endParaRPr>
@@ -4137,7 +4123,7 @@
           <p:spPr>
             <a:xfrm>
               <a:off x="447675" y="1678181"/>
-              <a:ext cx="800219" cy="230832"/>
+              <a:ext cx="729687" cy="215444"/>
             </a:xfrm>
             <a:prstGeom prst="rect">
               <a:avLst/>
@@ -4150,13 +4136,13 @@
             <a:lstStyle/>
             <a:p>
               <a:r>
-                <a:rPr lang="en-US" sz="900" dirty="0" err="1">
+                <a:rPr lang="en-US" sz="800" dirty="0" err="1">
                   <a:latin typeface="Times New Roman" panose="02020603050405020304" pitchFamily="18" charset="0"/>
                   <a:cs typeface="Times New Roman" panose="02020603050405020304" pitchFamily="18" charset="0"/>
                 </a:rPr>
                 <a:t>Isoflurophate</a:t>
               </a:r>
-              <a:endParaRPr lang="en-US" sz="900" dirty="0">
+              <a:endParaRPr lang="en-US" sz="800" dirty="0">
                 <a:latin typeface="Times New Roman" panose="02020603050405020304" pitchFamily="18" charset="0"/>
                 <a:cs typeface="Times New Roman" panose="02020603050405020304" pitchFamily="18" charset="0"/>
               </a:endParaRPr>
@@ -4172,7 +4158,7 @@
           <p:spPr>
             <a:xfrm>
               <a:off x="287851" y="1844597"/>
-              <a:ext cx="819455" cy="230832"/>
+              <a:ext cx="748923" cy="215444"/>
             </a:xfrm>
             <a:prstGeom prst="rect">
               <a:avLst/>
@@ -4185,13 +4171,13 @@
             <a:lstStyle/>
             <a:p>
               <a:r>
-                <a:rPr lang="en-US" sz="900" dirty="0" err="1">
+                <a:rPr lang="en-US" sz="800" dirty="0" err="1">
                   <a:latin typeface="Times New Roman" panose="02020603050405020304" pitchFamily="18" charset="0"/>
                   <a:cs typeface="Times New Roman" panose="02020603050405020304" pitchFamily="18" charset="0"/>
                 </a:rPr>
                 <a:t>Edrophonium</a:t>
               </a:r>
-              <a:endParaRPr lang="en-US" sz="900" dirty="0">
+              <a:endParaRPr lang="en-US" sz="800" dirty="0">
                 <a:latin typeface="Times New Roman" panose="02020603050405020304" pitchFamily="18" charset="0"/>
                 <a:cs typeface="Times New Roman" panose="02020603050405020304" pitchFamily="18" charset="0"/>
               </a:endParaRPr>
@@ -4206,8 +4192,8 @@
           </p:nvSpPr>
           <p:spPr>
             <a:xfrm>
-              <a:off x="265095" y="2464599"/>
-              <a:ext cx="774571" cy="230832"/>
+              <a:off x="500884" y="2386210"/>
+              <a:ext cx="708848" cy="215444"/>
             </a:xfrm>
             <a:prstGeom prst="rect">
               <a:avLst/>
@@ -4220,7 +4206,7 @@
             <a:lstStyle/>
             <a:p>
               <a:r>
-                <a:rPr lang="en-US" sz="900" dirty="0">
+                <a:rPr lang="en-US" sz="800" dirty="0">
                   <a:latin typeface="Times New Roman" panose="02020603050405020304" pitchFamily="18" charset="0"/>
                   <a:cs typeface="Times New Roman" panose="02020603050405020304" pitchFamily="18" charset="0"/>
                 </a:rPr>
@@ -4238,7 +4224,7 @@
           <p:spPr>
             <a:xfrm>
               <a:off x="269697" y="1991569"/>
-              <a:ext cx="819455" cy="230832"/>
+              <a:ext cx="748923" cy="215444"/>
             </a:xfrm>
             <a:prstGeom prst="rect">
               <a:avLst/>
@@ -4251,13 +4237,13 @@
             <a:lstStyle/>
             <a:p>
               <a:r>
-                <a:rPr lang="en-US" sz="900" dirty="0" err="1">
+                <a:rPr lang="en-US" sz="800" dirty="0" err="1">
                   <a:latin typeface="Times New Roman" panose="02020603050405020304" pitchFamily="18" charset="0"/>
                   <a:cs typeface="Times New Roman" panose="02020603050405020304" pitchFamily="18" charset="0"/>
                 </a:rPr>
                 <a:t>Ambenonium</a:t>
               </a:r>
-              <a:endParaRPr lang="en-US" sz="900" dirty="0">
+              <a:endParaRPr lang="en-US" sz="800" dirty="0">
                 <a:latin typeface="Times New Roman" panose="02020603050405020304" pitchFamily="18" charset="0"/>
                 <a:cs typeface="Times New Roman" panose="02020603050405020304" pitchFamily="18" charset="0"/>
               </a:endParaRPr>
@@ -4272,8 +4258,8 @@
           </p:nvSpPr>
           <p:spPr>
             <a:xfrm>
-              <a:off x="804377" y="2316550"/>
-              <a:ext cx="800219" cy="230832"/>
+              <a:off x="921098" y="2128105"/>
+              <a:ext cx="732893" cy="215444"/>
             </a:xfrm>
             <a:prstGeom prst="rect">
               <a:avLst/>
@@ -4286,13 +4272,13 @@
             <a:lstStyle/>
             <a:p>
               <a:r>
-                <a:rPr lang="en-US" sz="900" dirty="0" err="1">
+                <a:rPr lang="en-US" sz="800" dirty="0" err="1">
                   <a:latin typeface="Times New Roman" panose="02020603050405020304" pitchFamily="18" charset="0"/>
                   <a:cs typeface="Times New Roman" panose="02020603050405020304" pitchFamily="18" charset="0"/>
                 </a:rPr>
                 <a:t>Rivastigmine</a:t>
               </a:r>
-              <a:endParaRPr lang="en-US" sz="900" dirty="0">
+              <a:endParaRPr lang="en-US" sz="800" dirty="0">
                 <a:latin typeface="Times New Roman" panose="02020603050405020304" pitchFamily="18" charset="0"/>
                 <a:cs typeface="Times New Roman" panose="02020603050405020304" pitchFamily="18" charset="0"/>
               </a:endParaRPr>
@@ -4307,8 +4293,8 @@
           </p:nvSpPr>
           <p:spPr>
             <a:xfrm>
-              <a:off x="883034" y="2459134"/>
-              <a:ext cx="864339" cy="230832"/>
+              <a:off x="746502" y="2251613"/>
+              <a:ext cx="790601" cy="215444"/>
             </a:xfrm>
             <a:prstGeom prst="rect">
               <a:avLst/>
@@ -4321,13 +4307,13 @@
             <a:lstStyle/>
             <a:p>
               <a:r>
-                <a:rPr lang="en-US" sz="900" dirty="0" err="1">
+                <a:rPr lang="en-US" sz="800" dirty="0" err="1">
                   <a:latin typeface="Times New Roman" panose="02020603050405020304" pitchFamily="18" charset="0"/>
                   <a:cs typeface="Times New Roman" panose="02020603050405020304" pitchFamily="18" charset="0"/>
                 </a:rPr>
                 <a:t>Physostigmine</a:t>
               </a:r>
-              <a:endParaRPr lang="en-US" sz="900" dirty="0">
+              <a:endParaRPr lang="en-US" sz="800" dirty="0">
                 <a:latin typeface="Times New Roman" panose="02020603050405020304" pitchFamily="18" charset="0"/>
                 <a:cs typeface="Times New Roman" panose="02020603050405020304" pitchFamily="18" charset="0"/>
               </a:endParaRPr>
@@ -4342,8 +4328,8 @@
           </p:nvSpPr>
           <p:spPr>
             <a:xfrm>
-              <a:off x="974194" y="1847105"/>
-              <a:ext cx="774571" cy="230832"/>
+              <a:off x="897047" y="1847659"/>
+              <a:ext cx="707245" cy="215444"/>
             </a:xfrm>
             <a:prstGeom prst="rect">
               <a:avLst/>
@@ -4356,13 +4342,13 @@
             <a:lstStyle/>
             <a:p>
               <a:r>
-                <a:rPr lang="en-US" sz="900" dirty="0" err="1">
+                <a:rPr lang="en-US" sz="800" dirty="0" err="1">
                   <a:latin typeface="Times New Roman" panose="02020603050405020304" pitchFamily="18" charset="0"/>
                   <a:cs typeface="Times New Roman" panose="02020603050405020304" pitchFamily="18" charset="0"/>
                 </a:rPr>
                 <a:t>Galantamine</a:t>
               </a:r>
-              <a:endParaRPr lang="en-US" sz="900" dirty="0">
+              <a:endParaRPr lang="en-US" sz="800" dirty="0">
                 <a:latin typeface="Times New Roman" panose="02020603050405020304" pitchFamily="18" charset="0"/>
                 <a:cs typeface="Times New Roman" panose="02020603050405020304" pitchFamily="18" charset="0"/>
               </a:endParaRPr>
@@ -4377,8 +4363,8 @@
           </p:nvSpPr>
           <p:spPr>
             <a:xfrm>
-              <a:off x="1007615" y="2150218"/>
-              <a:ext cx="780983" cy="230832"/>
+              <a:off x="874900" y="1992489"/>
+              <a:ext cx="712054" cy="215444"/>
             </a:xfrm>
             <a:prstGeom prst="rect">
               <a:avLst/>
@@ -4391,13 +4377,13 @@
             <a:lstStyle/>
             <a:p>
               <a:r>
-                <a:rPr lang="en-US" sz="900" dirty="0" err="1">
+                <a:rPr lang="en-US" sz="800" dirty="0" err="1">
                   <a:latin typeface="Times New Roman" panose="02020603050405020304" pitchFamily="18" charset="0"/>
                   <a:cs typeface="Times New Roman" panose="02020603050405020304" pitchFamily="18" charset="0"/>
                 </a:rPr>
                 <a:t>Demecarium</a:t>
               </a:r>
-              <a:endParaRPr lang="en-US" sz="900" dirty="0">
+              <a:endParaRPr lang="en-US" sz="800" dirty="0">
                 <a:latin typeface="Times New Roman" panose="02020603050405020304" pitchFamily="18" charset="0"/>
                 <a:cs typeface="Times New Roman" panose="02020603050405020304" pitchFamily="18" charset="0"/>
               </a:endParaRPr>
@@ -4413,7 +4399,7 @@
           <p:spPr>
             <a:xfrm>
               <a:off x="280643" y="1675013"/>
-              <a:ext cx="319318" cy="230832"/>
+              <a:ext cx="303288" cy="215444"/>
             </a:xfrm>
             <a:prstGeom prst="rect">
               <a:avLst/>
@@ -4426,13 +4412,13 @@
             <a:lstStyle/>
             <a:p>
               <a:r>
-                <a:rPr lang="en-US" sz="900" b="1" dirty="0" smtClean="0">
+                <a:rPr lang="en-US" sz="800" b="1" dirty="0" smtClean="0">
                   <a:latin typeface="Times New Roman" panose="02020603050405020304" pitchFamily="18" charset="0"/>
                   <a:cs typeface="Times New Roman" panose="02020603050405020304" pitchFamily="18" charset="0"/>
                 </a:rPr>
                 <a:t>(3)</a:t>
               </a:r>
-              <a:endParaRPr lang="en-US" sz="900" b="1" dirty="0">
+              <a:endParaRPr lang="en-US" sz="800" b="1" dirty="0">
                 <a:latin typeface="Times New Roman" panose="02020603050405020304" pitchFamily="18" charset="0"/>
                 <a:cs typeface="Times New Roman" panose="02020603050405020304" pitchFamily="18" charset="0"/>
               </a:endParaRPr>
@@ -4448,10 +4434,10 @@
         </p:nvGrpSpPr>
         <p:grpSpPr>
           <a:xfrm>
-            <a:off x="279926" y="2624986"/>
-            <a:ext cx="1626291" cy="1409649"/>
-            <a:chOff x="312580" y="2933751"/>
-            <a:chExt cx="1626291" cy="1409649"/>
+            <a:off x="265472" y="2059862"/>
+            <a:ext cx="1711083" cy="918198"/>
+            <a:chOff x="285475" y="2929957"/>
+            <a:chExt cx="1711083" cy="918198"/>
           </a:xfrm>
         </p:grpSpPr>
         <p:sp>
@@ -4462,8 +4448,8 @@
           </p:nvSpPr>
           <p:spPr>
             <a:xfrm>
-              <a:off x="357304" y="2946167"/>
-              <a:ext cx="1579448" cy="1397233"/>
+              <a:off x="357304" y="2946168"/>
+              <a:ext cx="1579448" cy="876638"/>
             </a:xfrm>
             <a:prstGeom prst="roundRect">
               <a:avLst>
@@ -4502,7 +4488,7 @@
             <a:lstStyle/>
             <a:p>
               <a:pPr algn="ctr"/>
-              <a:endParaRPr lang="en-US" sz="900">
+              <a:endParaRPr lang="en-US" sz="800">
                 <a:latin typeface="Times New Roman" panose="02020603050405020304" pitchFamily="18" charset="0"/>
                 <a:cs typeface="Times New Roman" panose="02020603050405020304" pitchFamily="18" charset="0"/>
               </a:endParaRPr>
@@ -4517,8 +4503,8 @@
           </p:nvSpPr>
           <p:spPr>
             <a:xfrm>
-              <a:off x="354176" y="3112408"/>
-              <a:ext cx="825867" cy="230832"/>
+              <a:off x="334055" y="3072612"/>
+              <a:ext cx="753732" cy="215444"/>
             </a:xfrm>
             <a:prstGeom prst="rect">
               <a:avLst/>
@@ -4531,7 +4517,7 @@
             <a:lstStyle/>
             <a:p>
               <a:r>
-                <a:rPr lang="en-US" sz="900" dirty="0">
+                <a:rPr lang="en-US" sz="800" dirty="0">
                   <a:latin typeface="Times New Roman" panose="02020603050405020304" pitchFamily="18" charset="0"/>
                   <a:cs typeface="Times New Roman" panose="02020603050405020304" pitchFamily="18" charset="0"/>
                 </a:rPr>
@@ -4548,8 +4534,8 @@
           </p:nvSpPr>
           <p:spPr>
             <a:xfrm>
-              <a:off x="348817" y="3253074"/>
-              <a:ext cx="755335" cy="230832"/>
+              <a:off x="306858" y="3217235"/>
+              <a:ext cx="691215" cy="215444"/>
             </a:xfrm>
             <a:prstGeom prst="rect">
               <a:avLst/>
@@ -4562,13 +4548,13 @@
             <a:lstStyle/>
             <a:p>
               <a:r>
-                <a:rPr lang="en-US" sz="900" dirty="0" err="1">
+                <a:rPr lang="en-US" sz="800" dirty="0" err="1">
                   <a:latin typeface="Times New Roman" panose="02020603050405020304" pitchFamily="18" charset="0"/>
                   <a:cs typeface="Times New Roman" panose="02020603050405020304" pitchFamily="18" charset="0"/>
                 </a:rPr>
                 <a:t>Butabarbital</a:t>
               </a:r>
-              <a:endParaRPr lang="en-US" sz="900" dirty="0">
+              <a:endParaRPr lang="en-US" sz="800" dirty="0">
                 <a:latin typeface="Times New Roman" panose="02020603050405020304" pitchFamily="18" charset="0"/>
                 <a:cs typeface="Times New Roman" panose="02020603050405020304" pitchFamily="18" charset="0"/>
               </a:endParaRPr>
@@ -4583,8 +4569,8 @@
           </p:nvSpPr>
           <p:spPr>
             <a:xfrm>
-              <a:off x="995606" y="3257281"/>
-              <a:ext cx="569387" cy="230832"/>
+              <a:off x="1433141" y="3079454"/>
+              <a:ext cx="526106" cy="215444"/>
             </a:xfrm>
             <a:prstGeom prst="rect">
               <a:avLst/>
@@ -4597,13 +4583,13 @@
             <a:lstStyle/>
             <a:p>
               <a:r>
-                <a:rPr lang="en-US" sz="900" dirty="0" err="1">
+                <a:rPr lang="en-US" sz="800" dirty="0" err="1">
                   <a:latin typeface="Times New Roman" panose="02020603050405020304" pitchFamily="18" charset="0"/>
                   <a:cs typeface="Times New Roman" panose="02020603050405020304" pitchFamily="18" charset="0"/>
                 </a:rPr>
                 <a:t>Talbutal</a:t>
               </a:r>
-              <a:endParaRPr lang="en-US" sz="900" dirty="0">
+              <a:endParaRPr lang="en-US" sz="800" dirty="0">
                 <a:latin typeface="Times New Roman" panose="02020603050405020304" pitchFamily="18" charset="0"/>
                 <a:cs typeface="Times New Roman" panose="02020603050405020304" pitchFamily="18" charset="0"/>
               </a:endParaRPr>
@@ -4618,8 +4604,8 @@
           </p:nvSpPr>
           <p:spPr>
             <a:xfrm>
-              <a:off x="352488" y="4046045"/>
-              <a:ext cx="639919" cy="230832"/>
+              <a:off x="317526" y="3627781"/>
+              <a:ext cx="590226" cy="215444"/>
             </a:xfrm>
             <a:prstGeom prst="rect">
               <a:avLst/>
@@ -4632,13 +4618,13 @@
             <a:lstStyle/>
             <a:p>
               <a:r>
-                <a:rPr lang="en-US" sz="900" dirty="0" err="1">
+                <a:rPr lang="en-US" sz="800" dirty="0" err="1">
                   <a:latin typeface="Times New Roman" panose="02020603050405020304" pitchFamily="18" charset="0"/>
                   <a:cs typeface="Times New Roman" panose="02020603050405020304" pitchFamily="18" charset="0"/>
                 </a:rPr>
                 <a:t>Butalbital</a:t>
               </a:r>
-              <a:endParaRPr lang="en-US" sz="900" dirty="0">
+              <a:endParaRPr lang="en-US" sz="800" dirty="0">
                 <a:latin typeface="Times New Roman" panose="02020603050405020304" pitchFamily="18" charset="0"/>
                 <a:cs typeface="Times New Roman" panose="02020603050405020304" pitchFamily="18" charset="0"/>
               </a:endParaRPr>
@@ -4653,8 +4639,8 @@
           </p:nvSpPr>
           <p:spPr>
             <a:xfrm>
-              <a:off x="1138652" y="2947943"/>
-              <a:ext cx="800219" cy="230832"/>
+              <a:off x="1034877" y="2929957"/>
+              <a:ext cx="731290" cy="215444"/>
             </a:xfrm>
             <a:prstGeom prst="rect">
               <a:avLst/>
@@ -4667,7 +4653,7 @@
             <a:lstStyle/>
             <a:p>
               <a:r>
-                <a:rPr lang="en-US" sz="900" dirty="0">
+                <a:rPr lang="en-US" sz="800" dirty="0">
                   <a:latin typeface="Times New Roman" panose="02020603050405020304" pitchFamily="18" charset="0"/>
                   <a:cs typeface="Times New Roman" panose="02020603050405020304" pitchFamily="18" charset="0"/>
                 </a:rPr>
@@ -4684,8 +4670,8 @@
           </p:nvSpPr>
           <p:spPr>
             <a:xfrm>
-              <a:off x="1051503" y="3111488"/>
-              <a:ext cx="684803" cy="230832"/>
+              <a:off x="947869" y="3079454"/>
+              <a:ext cx="628698" cy="215444"/>
             </a:xfrm>
             <a:prstGeom prst="rect">
               <a:avLst/>
@@ -4698,7 +4684,7 @@
             <a:lstStyle/>
             <a:p>
               <a:r>
-                <a:rPr lang="en-US" sz="900" dirty="0">
+                <a:rPr lang="en-US" sz="800" dirty="0">
                   <a:latin typeface="Times New Roman" panose="02020603050405020304" pitchFamily="18" charset="0"/>
                   <a:cs typeface="Times New Roman" panose="02020603050405020304" pitchFamily="18" charset="0"/>
                 </a:rPr>
@@ -4715,8 +4701,8 @@
           </p:nvSpPr>
           <p:spPr>
             <a:xfrm>
-              <a:off x="338600" y="3736853"/>
-              <a:ext cx="787395" cy="230832"/>
+              <a:off x="488292" y="3498306"/>
+              <a:ext cx="718466" cy="215444"/>
             </a:xfrm>
             <a:prstGeom prst="rect">
               <a:avLst/>
@@ -4729,13 +4715,13 @@
             <a:lstStyle/>
             <a:p>
               <a:r>
-                <a:rPr lang="en-US" sz="900" dirty="0" err="1">
+                <a:rPr lang="en-US" sz="800" dirty="0" err="1">
                   <a:latin typeface="Times New Roman" panose="02020603050405020304" pitchFamily="18" charset="0"/>
                   <a:cs typeface="Times New Roman" panose="02020603050405020304" pitchFamily="18" charset="0"/>
                 </a:rPr>
                 <a:t>Hexobarbital</a:t>
               </a:r>
-              <a:endParaRPr lang="en-US" sz="900" dirty="0">
+              <a:endParaRPr lang="en-US" sz="800" dirty="0">
                 <a:latin typeface="Times New Roman" panose="02020603050405020304" pitchFamily="18" charset="0"/>
                 <a:cs typeface="Times New Roman" panose="02020603050405020304" pitchFamily="18" charset="0"/>
               </a:endParaRPr>
@@ -4750,8 +4736,8 @@
           </p:nvSpPr>
           <p:spPr>
             <a:xfrm>
-              <a:off x="340669" y="3415685"/>
-              <a:ext cx="813043" cy="230832"/>
+              <a:off x="672343" y="3368950"/>
+              <a:ext cx="740908" cy="215444"/>
             </a:xfrm>
             <a:prstGeom prst="rect">
               <a:avLst/>
@@ -4764,13 +4750,13 @@
             <a:lstStyle/>
             <a:p>
               <a:r>
-                <a:rPr lang="en-US" sz="900" dirty="0" err="1">
+                <a:rPr lang="en-US" sz="800" dirty="0" err="1">
                   <a:latin typeface="Times New Roman" panose="02020603050405020304" pitchFamily="18" charset="0"/>
                   <a:cs typeface="Times New Roman" panose="02020603050405020304" pitchFamily="18" charset="0"/>
                 </a:rPr>
                 <a:t>Heptabarbital</a:t>
               </a:r>
-              <a:endParaRPr lang="en-US" sz="900" dirty="0">
+              <a:endParaRPr lang="en-US" sz="800" dirty="0">
                 <a:latin typeface="Times New Roman" panose="02020603050405020304" pitchFamily="18" charset="0"/>
                 <a:cs typeface="Times New Roman" panose="02020603050405020304" pitchFamily="18" charset="0"/>
               </a:endParaRPr>
@@ -4785,8 +4771,8 @@
           </p:nvSpPr>
           <p:spPr>
             <a:xfrm>
-              <a:off x="993938" y="3732568"/>
-              <a:ext cx="761747" cy="230832"/>
+              <a:off x="1069565" y="3500465"/>
+              <a:ext cx="696024" cy="215444"/>
             </a:xfrm>
             <a:prstGeom prst="rect">
               <a:avLst/>
@@ -4799,13 +4785,13 @@
             <a:lstStyle/>
             <a:p>
               <a:r>
-                <a:rPr lang="en-US" sz="900" dirty="0" err="1">
+                <a:rPr lang="en-US" sz="800" dirty="0" err="1">
                   <a:latin typeface="Times New Roman" panose="02020603050405020304" pitchFamily="18" charset="0"/>
                   <a:cs typeface="Times New Roman" panose="02020603050405020304" pitchFamily="18" charset="0"/>
                 </a:rPr>
                 <a:t>Secobarbital</a:t>
               </a:r>
-              <a:endParaRPr lang="en-US" sz="900" dirty="0">
+              <a:endParaRPr lang="en-US" sz="800" dirty="0">
                 <a:latin typeface="Times New Roman" panose="02020603050405020304" pitchFamily="18" charset="0"/>
                 <a:cs typeface="Times New Roman" panose="02020603050405020304" pitchFamily="18" charset="0"/>
               </a:endParaRPr>
@@ -4820,8 +4806,8 @@
           </p:nvSpPr>
           <p:spPr>
             <a:xfrm>
-              <a:off x="348817" y="3896529"/>
-              <a:ext cx="575799" cy="230832"/>
+              <a:off x="285475" y="3370418"/>
+              <a:ext cx="532518" cy="215444"/>
             </a:xfrm>
             <a:prstGeom prst="rect">
               <a:avLst/>
@@ -4834,13 +4820,13 @@
             <a:lstStyle/>
             <a:p>
               <a:r>
-                <a:rPr lang="en-US" sz="900" dirty="0" err="1">
+                <a:rPr lang="en-US" sz="800" dirty="0" err="1">
                   <a:latin typeface="Times New Roman" panose="02020603050405020304" pitchFamily="18" charset="0"/>
                   <a:cs typeface="Times New Roman" panose="02020603050405020304" pitchFamily="18" charset="0"/>
                 </a:rPr>
                 <a:t>Butethal</a:t>
               </a:r>
-              <a:endParaRPr lang="en-US" sz="900" dirty="0">
+              <a:endParaRPr lang="en-US" sz="800" dirty="0">
                 <a:latin typeface="Times New Roman" panose="02020603050405020304" pitchFamily="18" charset="0"/>
                 <a:cs typeface="Times New Roman" panose="02020603050405020304" pitchFamily="18" charset="0"/>
               </a:endParaRPr>
@@ -4855,8 +4841,8 @@
           </p:nvSpPr>
           <p:spPr>
             <a:xfrm>
-              <a:off x="767109" y="3908354"/>
-              <a:ext cx="1152880" cy="230832"/>
+              <a:off x="771262" y="3632711"/>
+              <a:ext cx="1043876" cy="215444"/>
             </a:xfrm>
             <a:prstGeom prst="rect">
               <a:avLst/>
@@ -4869,13 +4855,13 @@
             <a:lstStyle/>
             <a:p>
               <a:r>
-                <a:rPr lang="en-US" sz="900" dirty="0" err="1">
+                <a:rPr lang="en-US" sz="800" dirty="0" err="1">
                   <a:latin typeface="Times New Roman" panose="02020603050405020304" pitchFamily="18" charset="0"/>
                   <a:cs typeface="Times New Roman" panose="02020603050405020304" pitchFamily="18" charset="0"/>
                 </a:rPr>
                 <a:t>Methylphenobarbital</a:t>
               </a:r>
-              <a:endParaRPr lang="en-US" sz="900" dirty="0">
+              <a:endParaRPr lang="en-US" sz="800" dirty="0">
                 <a:latin typeface="Times New Roman" panose="02020603050405020304" pitchFamily="18" charset="0"/>
                 <a:cs typeface="Times New Roman" panose="02020603050405020304" pitchFamily="18" charset="0"/>
               </a:endParaRPr>
@@ -4890,8 +4876,8 @@
           </p:nvSpPr>
           <p:spPr>
             <a:xfrm>
-              <a:off x="338600" y="3578527"/>
-              <a:ext cx="774571" cy="230832"/>
+              <a:off x="1289313" y="3364767"/>
+              <a:ext cx="707245" cy="215444"/>
             </a:xfrm>
             <a:prstGeom prst="rect">
               <a:avLst/>
@@ -4904,13 +4890,13 @@
             <a:lstStyle/>
             <a:p>
               <a:r>
-                <a:rPr lang="en-US" sz="900" dirty="0" err="1">
+                <a:rPr lang="en-US" sz="800" dirty="0" err="1">
                   <a:latin typeface="Times New Roman" panose="02020603050405020304" pitchFamily="18" charset="0"/>
                   <a:cs typeface="Times New Roman" panose="02020603050405020304" pitchFamily="18" charset="0"/>
                 </a:rPr>
                 <a:t>Aprobarbital</a:t>
               </a:r>
-              <a:endParaRPr lang="en-US" sz="900" dirty="0">
+              <a:endParaRPr lang="en-US" sz="800" dirty="0">
                 <a:latin typeface="Times New Roman" panose="02020603050405020304" pitchFamily="18" charset="0"/>
                 <a:cs typeface="Times New Roman" panose="02020603050405020304" pitchFamily="18" charset="0"/>
               </a:endParaRPr>
@@ -4925,8 +4911,8 @@
           </p:nvSpPr>
           <p:spPr>
             <a:xfrm>
-              <a:off x="982744" y="3574242"/>
-              <a:ext cx="665567" cy="230832"/>
+              <a:off x="862983" y="3216962"/>
+              <a:ext cx="612668" cy="215444"/>
             </a:xfrm>
             <a:prstGeom prst="rect">
               <a:avLst/>
@@ -4939,13 +4925,13 @@
             <a:lstStyle/>
             <a:p>
               <a:r>
-                <a:rPr lang="en-US" sz="900" dirty="0" err="1">
+                <a:rPr lang="en-US" sz="800" dirty="0" err="1">
                   <a:latin typeface="Times New Roman" panose="02020603050405020304" pitchFamily="18" charset="0"/>
                   <a:cs typeface="Times New Roman" panose="02020603050405020304" pitchFamily="18" charset="0"/>
                 </a:rPr>
                 <a:t>Primidone</a:t>
               </a:r>
-              <a:endParaRPr lang="en-US" sz="900" dirty="0">
+              <a:endParaRPr lang="en-US" sz="800" dirty="0">
                 <a:latin typeface="Times New Roman" panose="02020603050405020304" pitchFamily="18" charset="0"/>
                 <a:cs typeface="Times New Roman" panose="02020603050405020304" pitchFamily="18" charset="0"/>
               </a:endParaRPr>
@@ -4960,8 +4946,8 @@
           </p:nvSpPr>
           <p:spPr>
             <a:xfrm>
-              <a:off x="504753" y="2942163"/>
-              <a:ext cx="768159" cy="230832"/>
+              <a:off x="476913" y="2930879"/>
+              <a:ext cx="702436" cy="215444"/>
             </a:xfrm>
             <a:prstGeom prst="rect">
               <a:avLst/>
@@ -4974,13 +4960,13 @@
             <a:lstStyle/>
             <a:p>
               <a:r>
-                <a:rPr lang="en-US" sz="900" dirty="0" err="1">
+                <a:rPr lang="en-US" sz="800" dirty="0" err="1">
                   <a:latin typeface="Times New Roman" panose="02020603050405020304" pitchFamily="18" charset="0"/>
                   <a:cs typeface="Times New Roman" panose="02020603050405020304" pitchFamily="18" charset="0"/>
                 </a:rPr>
                 <a:t>Amobarbital</a:t>
               </a:r>
-              <a:endParaRPr lang="en-US" sz="900" dirty="0">
+              <a:endParaRPr lang="en-US" sz="800" dirty="0">
                 <a:latin typeface="Times New Roman" panose="02020603050405020304" pitchFamily="18" charset="0"/>
                 <a:cs typeface="Times New Roman" panose="02020603050405020304" pitchFamily="18" charset="0"/>
               </a:endParaRPr>
@@ -4995,8 +4981,8 @@
           </p:nvSpPr>
           <p:spPr>
             <a:xfrm>
-              <a:off x="1004097" y="3411768"/>
-              <a:ext cx="723275" cy="230832"/>
+              <a:off x="1334197" y="3217235"/>
+              <a:ext cx="662361" cy="215444"/>
             </a:xfrm>
             <a:prstGeom prst="rect">
               <a:avLst/>
@@ -5009,13 +4995,13 @@
             <a:lstStyle/>
             <a:p>
               <a:r>
-                <a:rPr lang="en-US" sz="900" dirty="0" err="1">
+                <a:rPr lang="en-US" sz="800" dirty="0" err="1">
                   <a:latin typeface="Times New Roman" panose="02020603050405020304" pitchFamily="18" charset="0"/>
                   <a:cs typeface="Times New Roman" panose="02020603050405020304" pitchFamily="18" charset="0"/>
                 </a:rPr>
                 <a:t>Metharbital</a:t>
               </a:r>
-              <a:endParaRPr lang="en-US" sz="900" dirty="0">
+              <a:endParaRPr lang="en-US" sz="800" dirty="0">
                 <a:latin typeface="Times New Roman" panose="02020603050405020304" pitchFamily="18" charset="0"/>
                 <a:cs typeface="Times New Roman" panose="02020603050405020304" pitchFamily="18" charset="0"/>
               </a:endParaRPr>
@@ -5031,7 +5017,7 @@
           <p:spPr>
             <a:xfrm>
               <a:off x="312580" y="2933751"/>
-              <a:ext cx="319318" cy="230832"/>
+              <a:ext cx="303288" cy="215444"/>
             </a:xfrm>
             <a:prstGeom prst="rect">
               <a:avLst/>
@@ -5044,13 +5030,13 @@
             <a:lstStyle/>
             <a:p>
               <a:r>
-                <a:rPr lang="en-US" sz="900" b="1" dirty="0" smtClean="0">
+                <a:rPr lang="en-US" sz="800" b="1" dirty="0" smtClean="0">
                   <a:latin typeface="Times New Roman" panose="02020603050405020304" pitchFamily="18" charset="0"/>
                   <a:cs typeface="Times New Roman" panose="02020603050405020304" pitchFamily="18" charset="0"/>
                 </a:rPr>
                 <a:t>(4)</a:t>
               </a:r>
-              <a:endParaRPr lang="en-US" sz="900" b="1" dirty="0">
+              <a:endParaRPr lang="en-US" sz="800" b="1" dirty="0">
                 <a:latin typeface="Times New Roman" panose="02020603050405020304" pitchFamily="18" charset="0"/>
                 <a:cs typeface="Times New Roman" panose="02020603050405020304" pitchFamily="18" charset="0"/>
               </a:endParaRPr>
@@ -5066,8 +5052,8 @@
         </p:nvSpPr>
         <p:spPr>
           <a:xfrm>
-            <a:off x="2047369" y="3124200"/>
-            <a:ext cx="338554" cy="230832"/>
+            <a:off x="2051510" y="2187763"/>
+            <a:ext cx="320922" cy="215444"/>
           </a:xfrm>
           <a:prstGeom prst="rect">
             <a:avLst/>
@@ -5080,13 +5066,13 @@
           <a:lstStyle/>
           <a:p>
             <a:r>
-              <a:rPr lang="en-US" sz="900" b="1" dirty="0" smtClean="0">
+              <a:rPr lang="en-US" sz="800" b="1" dirty="0" smtClean="0">
                 <a:latin typeface="Times New Roman" panose="02020603050405020304" pitchFamily="18" charset="0"/>
                 <a:cs typeface="Times New Roman" panose="02020603050405020304" pitchFamily="18" charset="0"/>
               </a:rPr>
               <a:t>(E)</a:t>
             </a:r>
-            <a:endParaRPr lang="en-US" sz="900" b="1" dirty="0">
+            <a:endParaRPr lang="en-US" sz="800" b="1" dirty="0">
               <a:latin typeface="Times New Roman" panose="02020603050405020304" pitchFamily="18" charset="0"/>
               <a:cs typeface="Times New Roman" panose="02020603050405020304" pitchFamily="18" charset="0"/>
             </a:endParaRPr>
@@ -5101,8 +5087,8 @@
         </p:nvSpPr>
         <p:spPr>
           <a:xfrm>
-            <a:off x="2030090" y="279002"/>
-            <a:ext cx="338554" cy="230832"/>
+            <a:off x="2030728" y="412248"/>
+            <a:ext cx="320922" cy="215444"/>
           </a:xfrm>
           <a:prstGeom prst="rect">
             <a:avLst/>
@@ -5115,13 +5101,13 @@
           <a:lstStyle/>
           <a:p>
             <a:r>
-              <a:rPr lang="en-US" sz="900" b="1" dirty="0" smtClean="0">
+              <a:rPr lang="en-US" sz="800" b="1" dirty="0" smtClean="0">
                 <a:latin typeface="Times New Roman" panose="02020603050405020304" pitchFamily="18" charset="0"/>
                 <a:cs typeface="Times New Roman" panose="02020603050405020304" pitchFamily="18" charset="0"/>
               </a:rPr>
               <a:t>(B)</a:t>
             </a:r>
-            <a:endParaRPr lang="en-US" sz="900" b="1" dirty="0">
+            <a:endParaRPr lang="en-US" sz="800" b="1" dirty="0">
               <a:latin typeface="Times New Roman" panose="02020603050405020304" pitchFamily="18" charset="0"/>
               <a:cs typeface="Times New Roman" panose="02020603050405020304" pitchFamily="18" charset="0"/>
             </a:endParaRPr>
@@ -5136,10 +5122,10 @@
         </p:nvGrpSpPr>
         <p:grpSpPr>
           <a:xfrm>
-            <a:off x="2119174" y="1153171"/>
-            <a:ext cx="968186" cy="370829"/>
+            <a:off x="2153785" y="861030"/>
+            <a:ext cx="831678" cy="347644"/>
             <a:chOff x="2895001" y="779818"/>
-            <a:chExt cx="968186" cy="370829"/>
+            <a:chExt cx="831678" cy="347644"/>
           </a:xfrm>
         </p:grpSpPr>
         <p:sp>
@@ -5150,8 +5136,8 @@
           </p:nvSpPr>
           <p:spPr>
             <a:xfrm>
-              <a:off x="2940352" y="796666"/>
-              <a:ext cx="922835" cy="318252"/>
+              <a:off x="2940353" y="821936"/>
+              <a:ext cx="786326" cy="282190"/>
             </a:xfrm>
             <a:prstGeom prst="roundRect">
               <a:avLst/>
@@ -5188,7 +5174,7 @@
             <a:lstStyle/>
             <a:p>
               <a:pPr algn="ctr"/>
-              <a:endParaRPr lang="en-US" sz="900">
+              <a:endParaRPr lang="en-US" sz="800">
                 <a:latin typeface="Times New Roman" panose="02020603050405020304" pitchFamily="18" charset="0"/>
                 <a:cs typeface="Times New Roman" panose="02020603050405020304" pitchFamily="18" charset="0"/>
               </a:endParaRPr>
@@ -5203,8 +5189,8 @@
           </p:nvSpPr>
           <p:spPr>
             <a:xfrm>
-              <a:off x="3189351" y="919815"/>
-              <a:ext cx="582211" cy="230832"/>
+              <a:off x="3110983" y="912018"/>
+              <a:ext cx="537327" cy="215444"/>
             </a:xfrm>
             <a:prstGeom prst="rect">
               <a:avLst/>
@@ -5217,7 +5203,7 @@
             <a:lstStyle/>
             <a:p>
               <a:r>
-                <a:rPr lang="en-US" sz="900" dirty="0">
+                <a:rPr lang="en-US" sz="800" dirty="0">
                   <a:latin typeface="Times New Roman" panose="02020603050405020304" pitchFamily="18" charset="0"/>
                   <a:cs typeface="Times New Roman" panose="02020603050405020304" pitchFamily="18" charset="0"/>
                 </a:rPr>
@@ -5234,8 +5220,8 @@
           </p:nvSpPr>
           <p:spPr>
             <a:xfrm>
-              <a:off x="3120193" y="789281"/>
-              <a:ext cx="723275" cy="230832"/>
+              <a:off x="3065730" y="789134"/>
+              <a:ext cx="660758" cy="215444"/>
             </a:xfrm>
             <a:prstGeom prst="rect">
               <a:avLst/>
@@ -5248,13 +5234,13 @@
             <a:lstStyle/>
             <a:p>
               <a:r>
-                <a:rPr lang="en-US" sz="900" dirty="0" err="1">
+                <a:rPr lang="en-US" sz="800" dirty="0" err="1">
                   <a:latin typeface="Times New Roman" panose="02020603050405020304" pitchFamily="18" charset="0"/>
                   <a:cs typeface="Times New Roman" panose="02020603050405020304" pitchFamily="18" charset="0"/>
                 </a:rPr>
                 <a:t>Varenicline</a:t>
               </a:r>
-              <a:endParaRPr lang="en-US" sz="900" dirty="0">
+              <a:endParaRPr lang="en-US" sz="800" dirty="0">
                 <a:latin typeface="Times New Roman" panose="02020603050405020304" pitchFamily="18" charset="0"/>
                 <a:cs typeface="Times New Roman" panose="02020603050405020304" pitchFamily="18" charset="0"/>
               </a:endParaRPr>
@@ -5270,7 +5256,7 @@
           <p:spPr>
             <a:xfrm>
               <a:off x="2895001" y="779818"/>
-              <a:ext cx="319318" cy="230832"/>
+              <a:ext cx="303288" cy="215444"/>
             </a:xfrm>
             <a:prstGeom prst="rect">
               <a:avLst/>
@@ -5283,13 +5269,13 @@
             <a:lstStyle/>
             <a:p>
               <a:r>
-                <a:rPr lang="en-US" sz="900" b="1" dirty="0" smtClean="0">
+                <a:rPr lang="en-US" sz="800" b="1" dirty="0" smtClean="0">
                   <a:latin typeface="Times New Roman" panose="02020603050405020304" pitchFamily="18" charset="0"/>
                   <a:cs typeface="Times New Roman" panose="02020603050405020304" pitchFamily="18" charset="0"/>
                 </a:rPr>
                 <a:t>(5)</a:t>
               </a:r>
-              <a:endParaRPr lang="en-US" sz="900" b="1" dirty="0">
+              <a:endParaRPr lang="en-US" sz="800" b="1" dirty="0">
                 <a:latin typeface="Times New Roman" panose="02020603050405020304" pitchFamily="18" charset="0"/>
                 <a:cs typeface="Times New Roman" panose="02020603050405020304" pitchFamily="18" charset="0"/>
               </a:endParaRPr>
@@ -5305,8 +5291,8 @@
         </p:nvSpPr>
         <p:spPr>
           <a:xfrm>
-            <a:off x="2044163" y="1608493"/>
-            <a:ext cx="344966" cy="230832"/>
+            <a:off x="2044163" y="1222115"/>
+            <a:ext cx="325730" cy="215444"/>
           </a:xfrm>
           <a:prstGeom prst="rect">
             <a:avLst/>
@@ -5319,13 +5305,13 @@
           <a:lstStyle/>
           <a:p>
             <a:r>
-              <a:rPr lang="en-US" sz="900" b="1" dirty="0" smtClean="0">
+              <a:rPr lang="en-US" sz="800" b="1" dirty="0" smtClean="0">
                 <a:latin typeface="Times New Roman" panose="02020603050405020304" pitchFamily="18" charset="0"/>
                 <a:cs typeface="Times New Roman" panose="02020603050405020304" pitchFamily="18" charset="0"/>
               </a:rPr>
               <a:t>(C)</a:t>
             </a:r>
-            <a:endParaRPr lang="en-US" sz="900" b="1" dirty="0">
+            <a:endParaRPr lang="en-US" sz="800" b="1" dirty="0">
               <a:latin typeface="Times New Roman" panose="02020603050405020304" pitchFamily="18" charset="0"/>
               <a:cs typeface="Times New Roman" panose="02020603050405020304" pitchFamily="18" charset="0"/>
             </a:endParaRPr>
@@ -5340,8 +5326,8 @@
         </p:nvSpPr>
         <p:spPr>
           <a:xfrm>
-            <a:off x="2054077" y="2311365"/>
-            <a:ext cx="344966" cy="230832"/>
+            <a:off x="2030261" y="1701581"/>
+            <a:ext cx="325730" cy="215444"/>
           </a:xfrm>
           <a:prstGeom prst="rect">
             <a:avLst/>
@@ -5354,13 +5340,13 @@
           <a:lstStyle/>
           <a:p>
             <a:r>
-              <a:rPr lang="en-US" sz="900" b="1" dirty="0" smtClean="0">
+              <a:rPr lang="en-US" sz="800" b="1" dirty="0" smtClean="0">
                 <a:latin typeface="Times New Roman" panose="02020603050405020304" pitchFamily="18" charset="0"/>
                 <a:cs typeface="Times New Roman" panose="02020603050405020304" pitchFamily="18" charset="0"/>
               </a:rPr>
               <a:t>(D)</a:t>
             </a:r>
-            <a:endParaRPr lang="en-US" sz="900" b="1" dirty="0">
+            <a:endParaRPr lang="en-US" sz="800" b="1" dirty="0">
               <a:latin typeface="Times New Roman" panose="02020603050405020304" pitchFamily="18" charset="0"/>
               <a:cs typeface="Times New Roman" panose="02020603050405020304" pitchFamily="18" charset="0"/>
             </a:endParaRPr>
@@ -5376,7 +5362,7 @@
         <p:spPr>
           <a:xfrm>
             <a:off x="324460" y="610081"/>
-            <a:ext cx="1025122" cy="523028"/>
+            <a:ext cx="745387" cy="473062"/>
           </a:xfrm>
           <a:prstGeom prst="roundRect">
             <a:avLst/>
@@ -5413,7 +5399,7 @@
           <a:lstStyle/>
           <a:p>
             <a:pPr algn="ctr"/>
-            <a:endParaRPr lang="en-US" sz="900">
+            <a:endParaRPr lang="en-US" sz="800">
               <a:latin typeface="Times New Roman" panose="02020603050405020304" pitchFamily="18" charset="0"/>
               <a:cs typeface="Times New Roman" panose="02020603050405020304" pitchFamily="18" charset="0"/>
             </a:endParaRPr>
@@ -5428,8 +5414,8 @@
         </p:nvSpPr>
         <p:spPr>
           <a:xfrm>
-            <a:off x="506187" y="749224"/>
-            <a:ext cx="659155" cy="230832"/>
+            <a:off x="427412" y="589361"/>
+            <a:ext cx="606256" cy="215444"/>
           </a:xfrm>
           <a:prstGeom prst="rect">
             <a:avLst/>
@@ -5442,13 +5428,13 @@
           <a:lstStyle/>
           <a:p>
             <a:r>
-              <a:rPr lang="en-US" sz="900" dirty="0" err="1">
+              <a:rPr lang="en-US" sz="800" dirty="0" err="1">
                 <a:latin typeface="Times New Roman" panose="02020603050405020304" pitchFamily="18" charset="0"/>
                 <a:cs typeface="Times New Roman" panose="02020603050405020304" pitchFamily="18" charset="0"/>
               </a:rPr>
               <a:t>Malathion</a:t>
             </a:r>
-            <a:endParaRPr lang="en-US" sz="900" dirty="0">
+            <a:endParaRPr lang="en-US" sz="800" dirty="0">
               <a:latin typeface="Times New Roman" panose="02020603050405020304" pitchFamily="18" charset="0"/>
               <a:cs typeface="Times New Roman" panose="02020603050405020304" pitchFamily="18" charset="0"/>
             </a:endParaRPr>
@@ -5463,8 +5449,8 @@
         </p:nvSpPr>
         <p:spPr>
           <a:xfrm>
-            <a:off x="471581" y="586535"/>
-            <a:ext cx="889987" cy="230832"/>
+            <a:off x="294035" y="848165"/>
+            <a:ext cx="809837" cy="215444"/>
           </a:xfrm>
           <a:prstGeom prst="rect">
             <a:avLst/>
@@ -5477,13 +5463,13 @@
           <a:lstStyle/>
           <a:p>
             <a:r>
-              <a:rPr lang="en-US" sz="900" dirty="0" err="1">
+              <a:rPr lang="en-US" sz="800" dirty="0" err="1">
                 <a:latin typeface="Times New Roman" panose="02020603050405020304" pitchFamily="18" charset="0"/>
                 <a:cs typeface="Times New Roman" panose="02020603050405020304" pitchFamily="18" charset="0"/>
               </a:rPr>
               <a:t>Hexafluronium</a:t>
             </a:r>
-            <a:endParaRPr lang="en-US" sz="900" dirty="0">
+            <a:endParaRPr lang="en-US" sz="800" dirty="0">
               <a:latin typeface="Times New Roman" panose="02020603050405020304" pitchFamily="18" charset="0"/>
               <a:cs typeface="Times New Roman" panose="02020603050405020304" pitchFamily="18" charset="0"/>
             </a:endParaRPr>
@@ -5498,8 +5484,8 @@
         </p:nvSpPr>
         <p:spPr>
           <a:xfrm>
-            <a:off x="422028" y="912168"/>
-            <a:ext cx="851515" cy="230832"/>
+            <a:off x="293672" y="722251"/>
+            <a:ext cx="776175" cy="215444"/>
           </a:xfrm>
           <a:prstGeom prst="rect">
             <a:avLst/>
@@ -5512,13 +5498,13 @@
           <a:lstStyle/>
           <a:p>
             <a:r>
-              <a:rPr lang="en-US" sz="900" dirty="0" err="1">
+              <a:rPr lang="en-US" sz="800" dirty="0" err="1">
                 <a:latin typeface="Times New Roman" panose="02020603050405020304" pitchFamily="18" charset="0"/>
                 <a:cs typeface="Times New Roman" panose="02020603050405020304" pitchFamily="18" charset="0"/>
               </a:rPr>
               <a:t>Echothiophate</a:t>
             </a:r>
-            <a:endParaRPr lang="en-US" sz="900" dirty="0">
+            <a:endParaRPr lang="en-US" sz="800" dirty="0">
               <a:latin typeface="Times New Roman" panose="02020603050405020304" pitchFamily="18" charset="0"/>
               <a:cs typeface="Times New Roman" panose="02020603050405020304" pitchFamily="18" charset="0"/>
             </a:endParaRPr>
@@ -5534,7 +5520,7 @@
         <p:spPr>
           <a:xfrm>
             <a:off x="285508" y="582646"/>
-            <a:ext cx="319318" cy="230832"/>
+            <a:ext cx="303288" cy="215444"/>
           </a:xfrm>
           <a:prstGeom prst="rect">
             <a:avLst/>
@@ -5547,13 +5533,13 @@
           <a:lstStyle/>
           <a:p>
             <a:r>
-              <a:rPr lang="en-US" sz="900" b="1" dirty="0" smtClean="0">
+              <a:rPr lang="en-US" sz="800" b="1" dirty="0" smtClean="0">
                 <a:latin typeface="Times New Roman" panose="02020603050405020304" pitchFamily="18" charset="0"/>
                 <a:cs typeface="Times New Roman" panose="02020603050405020304" pitchFamily="18" charset="0"/>
               </a:rPr>
               <a:t>(1)</a:t>
             </a:r>
-            <a:endParaRPr lang="en-US" sz="900" b="1" dirty="0">
+            <a:endParaRPr lang="en-US" sz="800" b="1" dirty="0">
               <a:latin typeface="Times New Roman" panose="02020603050405020304" pitchFamily="18" charset="0"/>
               <a:cs typeface="Times New Roman" panose="02020603050405020304" pitchFamily="18" charset="0"/>
             </a:endParaRPr>
@@ -5570,7 +5556,7 @@
         </p:nvSpPr>
         <p:spPr>
           <a:xfrm rot="5400000">
-            <a:off x="1300095" y="3896102"/>
+            <a:off x="1327897" y="2418434"/>
             <a:ext cx="876462" cy="3096000"/>
           </a:xfrm>
           <a:prstGeom prst="rect">
@@ -5599,6 +5585,41 @@
           <a:p>
             <a:pPr algn="ctr"/>
             <a:endParaRPr lang="en-US" sz="900"/>
+          </a:p>
+        </p:txBody>
+      </p:sp>
+      <p:sp>
+        <p:nvSpPr>
+          <p:cNvPr id="71" name="Rectangle 70"/>
+          <p:cNvSpPr/>
+          <p:nvPr/>
+        </p:nvSpPr>
+        <p:spPr>
+          <a:xfrm>
+            <a:off x="1275727" y="715241"/>
+            <a:ext cx="726746" cy="215444"/>
+          </a:xfrm>
+          <a:prstGeom prst="rect">
+            <a:avLst/>
+          </a:prstGeom>
+        </p:spPr>
+        <p:txBody>
+          <a:bodyPr wrap="square">
+            <a:spAutoFit/>
+          </a:bodyPr>
+          <a:lstStyle/>
+          <a:p>
+            <a:r>
+              <a:rPr lang="en-US" sz="800" dirty="0" err="1" smtClean="0">
+                <a:latin typeface="Times New Roman" panose="02020603050405020304" pitchFamily="18" charset="0"/>
+                <a:cs typeface="Times New Roman" panose="02020603050405020304" pitchFamily="18" charset="0"/>
+              </a:rPr>
+              <a:t>Triethiodide</a:t>
+            </a:r>
+            <a:endParaRPr lang="en-US" sz="800" dirty="0">
+              <a:latin typeface="Times New Roman" panose="02020603050405020304" pitchFamily="18" charset="0"/>
+              <a:cs typeface="Times New Roman" panose="02020603050405020304" pitchFamily="18" charset="0"/>
+            </a:endParaRPr>
           </a:p>
         </p:txBody>
       </p:sp>

</xml_diff>